<commit_message>
updated ppt with new slides
</commit_message>
<xml_diff>
--- a/Cricket League and Teams.pptx
+++ b/Cricket League and Teams.pptx
@@ -11,9 +11,12 @@
     <p:sldId id="259" r:id="rId5"/>
     <p:sldId id="260" r:id="rId6"/>
     <p:sldId id="261" r:id="rId7"/>
-    <p:sldId id="262" r:id="rId8"/>
-    <p:sldId id="263" r:id="rId9"/>
-    <p:sldId id="264" r:id="rId10"/>
+    <p:sldId id="265" r:id="rId8"/>
+    <p:sldId id="262" r:id="rId9"/>
+    <p:sldId id="267" r:id="rId10"/>
+    <p:sldId id="263" r:id="rId11"/>
+    <p:sldId id="266" r:id="rId12"/>
+    <p:sldId id="264" r:id="rId13"/>
   </p:sldIdLst>
   <p:sldSz cx="12192000" cy="6858000"/>
   <p:notesSz cx="6858000" cy="9144000"/>
@@ -306,7 +309,7 @@
           <a:p>
             <a:fld id="{4AAD347D-5ACD-4C99-B74B-A9C85AD731AF}" type="datetimeFigureOut">
               <a:rPr lang="en-US" dirty="0"/>
-              <a:t>5/2/2019</a:t>
+              <a:t>5/3/2019</a:t>
             </a:fld>
             <a:endParaRPr lang="en-US" dirty="0"/>
           </a:p>
@@ -576,7 +579,7 @@
           <a:p>
             <a:fld id="{4509A250-FF31-4206-8172-F9D3106AACB1}" type="datetimeFigureOut">
               <a:rPr lang="en-US" dirty="0"/>
-              <a:t>5/2/2019</a:t>
+              <a:t>5/3/2019</a:t>
             </a:fld>
             <a:endParaRPr lang="en-US" dirty="0"/>
           </a:p>
@@ -765,7 +768,7 @@
           <a:p>
             <a:fld id="{4509A250-FF31-4206-8172-F9D3106AACB1}" type="datetimeFigureOut">
               <a:rPr lang="en-US" dirty="0"/>
-              <a:t>5/2/2019</a:t>
+              <a:t>5/3/2019</a:t>
             </a:fld>
             <a:endParaRPr lang="en-US" dirty="0"/>
           </a:p>
@@ -1033,7 +1036,7 @@
           <a:p>
             <a:fld id="{4509A250-FF31-4206-8172-F9D3106AACB1}" type="datetimeFigureOut">
               <a:rPr lang="en-US" dirty="0"/>
-              <a:t>5/2/2019</a:t>
+              <a:t>5/3/2019</a:t>
             </a:fld>
             <a:endParaRPr lang="en-US" dirty="0"/>
           </a:p>
@@ -1369,7 +1372,7 @@
           <a:p>
             <a:fld id="{4509A250-FF31-4206-8172-F9D3106AACB1}" type="datetimeFigureOut">
               <a:rPr lang="en-US" dirty="0"/>
-              <a:t>5/2/2019</a:t>
+              <a:t>5/3/2019</a:t>
             </a:fld>
             <a:endParaRPr lang="en-US" dirty="0"/>
           </a:p>
@@ -1987,7 +1990,7 @@
           <a:p>
             <a:fld id="{4509A250-FF31-4206-8172-F9D3106AACB1}" type="datetimeFigureOut">
               <a:rPr lang="en-US" dirty="0"/>
-              <a:t>5/2/2019</a:t>
+              <a:t>5/3/2019</a:t>
             </a:fld>
             <a:endParaRPr lang="en-US" dirty="0"/>
           </a:p>
@@ -2842,7 +2845,7 @@
           <a:p>
             <a:fld id="{4509A250-FF31-4206-8172-F9D3106AACB1}" type="datetimeFigureOut">
               <a:rPr lang="en-US" dirty="0"/>
-              <a:t>5/2/2019</a:t>
+              <a:t>5/3/2019</a:t>
             </a:fld>
             <a:endParaRPr lang="en-US" dirty="0"/>
           </a:p>
@@ -3007,7 +3010,7 @@
           <a:p>
             <a:fld id="{4509A250-FF31-4206-8172-F9D3106AACB1}" type="datetimeFigureOut">
               <a:rPr lang="en-US" dirty="0"/>
-              <a:t>5/2/2019</a:t>
+              <a:t>5/3/2019</a:t>
             </a:fld>
             <a:endParaRPr lang="en-US" dirty="0"/>
           </a:p>
@@ -3182,7 +3185,7 @@
           <a:p>
             <a:fld id="{4509A250-FF31-4206-8172-F9D3106AACB1}" type="datetimeFigureOut">
               <a:rPr lang="en-US" dirty="0"/>
-              <a:t>5/2/2019</a:t>
+              <a:t>5/3/2019</a:t>
             </a:fld>
             <a:endParaRPr lang="en-US" dirty="0"/>
           </a:p>
@@ -3347,7 +3350,7 @@
           <a:p>
             <a:fld id="{4509A250-FF31-4206-8172-F9D3106AACB1}" type="datetimeFigureOut">
               <a:rPr lang="en-US" dirty="0"/>
-              <a:t>5/2/2019</a:t>
+              <a:t>5/3/2019</a:t>
             </a:fld>
             <a:endParaRPr lang="en-US" dirty="0"/>
           </a:p>
@@ -3589,7 +3592,7 @@
           <a:p>
             <a:fld id="{9796027F-7875-4030-9381-8BD8C4F21935}" type="datetimeFigureOut">
               <a:rPr lang="en-US" dirty="0"/>
-              <a:t>5/2/2019</a:t>
+              <a:t>5/3/2019</a:t>
             </a:fld>
             <a:endParaRPr lang="en-US" dirty="0"/>
           </a:p>
@@ -3876,7 +3879,7 @@
           <a:p>
             <a:fld id="{9796027F-7875-4030-9381-8BD8C4F21935}" type="datetimeFigureOut">
               <a:rPr lang="en-US" dirty="0"/>
-              <a:t>5/2/2019</a:t>
+              <a:t>5/3/2019</a:t>
             </a:fld>
             <a:endParaRPr lang="en-US" dirty="0"/>
           </a:p>
@@ -4315,7 +4318,7 @@
           <a:p>
             <a:fld id="{9796027F-7875-4030-9381-8BD8C4F21935}" type="datetimeFigureOut">
               <a:rPr lang="en-US" dirty="0"/>
-              <a:t>5/2/2019</a:t>
+              <a:t>5/3/2019</a:t>
             </a:fld>
             <a:endParaRPr lang="en-US" dirty="0"/>
           </a:p>
@@ -4428,7 +4431,7 @@
           <a:p>
             <a:fld id="{4509A250-FF31-4206-8172-F9D3106AACB1}" type="datetimeFigureOut">
               <a:rPr lang="en-US" dirty="0"/>
-              <a:t>5/2/2019</a:t>
+              <a:t>5/3/2019</a:t>
             </a:fld>
             <a:endParaRPr lang="en-US" dirty="0"/>
           </a:p>
@@ -4518,7 +4521,7 @@
           <a:p>
             <a:fld id="{4509A250-FF31-4206-8172-F9D3106AACB1}" type="datetimeFigureOut">
               <a:rPr lang="en-US" dirty="0"/>
-              <a:t>5/2/2019</a:t>
+              <a:t>5/3/2019</a:t>
             </a:fld>
             <a:endParaRPr lang="en-US" dirty="0"/>
           </a:p>
@@ -4792,7 +4795,7 @@
           <a:p>
             <a:fld id="{4509A250-FF31-4206-8172-F9D3106AACB1}" type="datetimeFigureOut">
               <a:rPr lang="en-US" dirty="0"/>
-              <a:t>5/2/2019</a:t>
+              <a:t>5/3/2019</a:t>
             </a:fld>
             <a:endParaRPr lang="en-US" dirty="0"/>
           </a:p>
@@ -5062,7 +5065,7 @@
           <a:p>
             <a:fld id="{4509A250-FF31-4206-8172-F9D3106AACB1}" type="datetimeFigureOut">
               <a:rPr lang="en-US" dirty="0"/>
-              <a:t>5/2/2019</a:t>
+              <a:t>5/3/2019</a:t>
             </a:fld>
             <a:endParaRPr lang="en-US" dirty="0"/>
           </a:p>
@@ -5486,7 +5489,7 @@
           <a:p>
             <a:fld id="{4AAD347D-5ACD-4C99-B74B-A9C85AD731AF}" type="datetimeFigureOut">
               <a:rPr lang="en-US" dirty="0"/>
-              <a:t>5/2/2019</a:t>
+              <a:t>5/3/2019</a:t>
             </a:fld>
             <a:endParaRPr lang="en-US" dirty="0"/>
           </a:p>
@@ -6050,6 +6053,308 @@
 </p:sld>
 </file>
 
+<file path=ppt/slides/slide10.xml><?xml version="1.0" encoding="utf-8"?>
+<p:sld xmlns:a="http://schemas.openxmlformats.org/drawingml/2006/main" xmlns:r="http://schemas.openxmlformats.org/officeDocument/2006/relationships" xmlns:p="http://schemas.openxmlformats.org/presentationml/2006/main">
+  <p:cSld>
+    <p:spTree>
+      <p:nvGrpSpPr>
+        <p:cNvPr id="1" name=""/>
+        <p:cNvGrpSpPr/>
+        <p:nvPr/>
+      </p:nvGrpSpPr>
+      <p:grpSpPr>
+        <a:xfrm>
+          <a:off x="0" y="0"/>
+          <a:ext cx="0" cy="0"/>
+          <a:chOff x="0" y="0"/>
+          <a:chExt cx="0" cy="0"/>
+        </a:xfrm>
+      </p:grpSpPr>
+      <p:sp>
+        <p:nvSpPr>
+          <p:cNvPr id="2" name="Title 1"/>
+          <p:cNvSpPr>
+            <a:spLocks noGrp="1"/>
+          </p:cNvSpPr>
+          <p:nvPr>
+            <p:ph type="title"/>
+          </p:nvPr>
+        </p:nvSpPr>
+        <p:spPr/>
+        <p:txBody>
+          <a:bodyPr/>
+          <a:lstStyle/>
+          <a:p>
+            <a:r>
+              <a:rPr lang="en-IN" dirty="0" smtClean="0"/>
+              <a:t>Social Media Screen</a:t>
+            </a:r>
+            <a:endParaRPr lang="en-IN" dirty="0"/>
+          </a:p>
+        </p:txBody>
+      </p:sp>
+      <p:sp>
+        <p:nvSpPr>
+          <p:cNvPr id="3" name="Content Placeholder 2"/>
+          <p:cNvSpPr>
+            <a:spLocks noGrp="1"/>
+          </p:cNvSpPr>
+          <p:nvPr>
+            <p:ph idx="1"/>
+          </p:nvPr>
+        </p:nvSpPr>
+        <p:spPr>
+          <a:xfrm>
+            <a:off x="201975" y="1152983"/>
+            <a:ext cx="5467305" cy="4195481"/>
+          </a:xfrm>
+        </p:spPr>
+        <p:txBody>
+          <a:bodyPr/>
+          <a:lstStyle/>
+          <a:p>
+            <a:r>
+              <a:rPr lang="en-IN" dirty="0"/>
+              <a:t>The internet changed the way people interact with each other as well as work culture, and those changes first arose on social media sites. That is why social </a:t>
+            </a:r>
+            <a:r>
+              <a:rPr lang="en-IN" dirty="0" smtClean="0"/>
+              <a:t>networking sites</a:t>
+            </a:r>
+            <a:r>
+              <a:rPr lang="en-IN" dirty="0"/>
+              <a:t> are so important</a:t>
+            </a:r>
+            <a:r>
+              <a:rPr lang="en-IN" dirty="0" smtClean="0"/>
+              <a:t>.</a:t>
+            </a:r>
+          </a:p>
+          <a:p>
+            <a:r>
+              <a:rPr lang="en-IN" dirty="0" smtClean="0"/>
+              <a:t>This screen intimates the users to follow the application in all the mentioned social networking sites for new updates of the application.</a:t>
+            </a:r>
+          </a:p>
+          <a:p>
+            <a:endParaRPr lang="en-IN" dirty="0"/>
+          </a:p>
+        </p:txBody>
+      </p:sp>
+      <p:pic>
+        <p:nvPicPr>
+          <p:cNvPr id="4" name="Picture 3"/>
+          <p:cNvPicPr/>
+          <p:nvPr/>
+        </p:nvPicPr>
+        <p:blipFill rotWithShape="1">
+          <a:blip r:embed="rId2"/>
+          <a:srcRect t="2956" r="3778" b="5714"/>
+          <a:stretch/>
+        </p:blipFill>
+        <p:spPr bwMode="auto">
+          <a:xfrm>
+            <a:off x="5812970" y="1278119"/>
+            <a:ext cx="5682344" cy="3542075"/>
+          </a:xfrm>
+          <a:prstGeom prst="rect">
+            <a:avLst/>
+          </a:prstGeom>
+          <a:ln>
+            <a:noFill/>
+          </a:ln>
+          <a:extLst>
+            <a:ext uri="{53640926-AAD7-44D8-BBD7-CCE9431645EC}">
+              <a14:shadowObscured xmlns:a14="http://schemas.microsoft.com/office/drawing/2010/main"/>
+            </a:ext>
+          </a:extLst>
+        </p:spPr>
+      </p:pic>
+    </p:spTree>
+    <p:extLst>
+      <p:ext uri="{BB962C8B-B14F-4D97-AF65-F5344CB8AC3E}">
+        <p14:creationId xmlns:p14="http://schemas.microsoft.com/office/powerpoint/2010/main" val="1197301406"/>
+      </p:ext>
+    </p:extLst>
+  </p:cSld>
+  <p:clrMapOvr>
+    <a:masterClrMapping/>
+  </p:clrMapOvr>
+</p:sld>
+</file>
+
+<file path=ppt/slides/slide11.xml><?xml version="1.0" encoding="utf-8"?>
+<p:sld xmlns:a="http://schemas.openxmlformats.org/drawingml/2006/main" xmlns:r="http://schemas.openxmlformats.org/officeDocument/2006/relationships" xmlns:p="http://schemas.openxmlformats.org/presentationml/2006/main">
+  <p:cSld>
+    <p:spTree>
+      <p:nvGrpSpPr>
+        <p:cNvPr id="1" name=""/>
+        <p:cNvGrpSpPr/>
+        <p:nvPr/>
+      </p:nvGrpSpPr>
+      <p:grpSpPr>
+        <a:xfrm>
+          <a:off x="0" y="0"/>
+          <a:ext cx="0" cy="0"/>
+          <a:chOff x="0" y="0"/>
+          <a:chExt cx="0" cy="0"/>
+        </a:xfrm>
+      </p:grpSpPr>
+      <p:sp>
+        <p:nvSpPr>
+          <p:cNvPr id="2" name="Title 1"/>
+          <p:cNvSpPr>
+            <a:spLocks noGrp="1"/>
+          </p:cNvSpPr>
+          <p:nvPr>
+            <p:ph type="title"/>
+          </p:nvPr>
+        </p:nvSpPr>
+        <p:spPr/>
+        <p:txBody>
+          <a:bodyPr/>
+          <a:lstStyle/>
+          <a:p>
+            <a:r>
+              <a:rPr lang="en-IN" dirty="0" smtClean="0"/>
+              <a:t>Logout Screen</a:t>
+            </a:r>
+            <a:endParaRPr lang="en-IN" dirty="0"/>
+          </a:p>
+        </p:txBody>
+      </p:sp>
+      <p:sp>
+        <p:nvSpPr>
+          <p:cNvPr id="3" name="Content Placeholder 2"/>
+          <p:cNvSpPr>
+            <a:spLocks noGrp="1"/>
+          </p:cNvSpPr>
+          <p:nvPr>
+            <p:ph idx="1"/>
+          </p:nvPr>
+        </p:nvSpPr>
+        <p:spPr>
+          <a:xfrm>
+            <a:off x="104504" y="1267097"/>
+            <a:ext cx="5930536" cy="2508069"/>
+          </a:xfrm>
+        </p:spPr>
+        <p:txBody>
+          <a:bodyPr/>
+          <a:lstStyle/>
+          <a:p>
+            <a:r>
+              <a:rPr lang="en-IN" dirty="0" smtClean="0"/>
+              <a:t>On clicking the logout button in the menu bar user is able to logout from the application.</a:t>
+            </a:r>
+            <a:endParaRPr lang="en-IN" dirty="0"/>
+          </a:p>
+        </p:txBody>
+      </p:sp>
+      <p:pic>
+        <p:nvPicPr>
+          <p:cNvPr id="4" name="Picture 3"/>
+          <p:cNvPicPr/>
+          <p:nvPr/>
+        </p:nvPicPr>
+        <p:blipFill rotWithShape="1">
+          <a:blip r:embed="rId2"/>
+          <a:srcRect t="7094" r="2947" b="6601"/>
+          <a:stretch/>
+        </p:blipFill>
+        <p:spPr bwMode="auto">
+          <a:xfrm>
+            <a:off x="5747657" y="1267097"/>
+            <a:ext cx="6173289" cy="3526972"/>
+          </a:xfrm>
+          <a:prstGeom prst="rect">
+            <a:avLst/>
+          </a:prstGeom>
+          <a:ln>
+            <a:noFill/>
+          </a:ln>
+          <a:extLst>
+            <a:ext uri="{53640926-AAD7-44D8-BBD7-CCE9431645EC}">
+              <a14:shadowObscured xmlns:a14="http://schemas.microsoft.com/office/drawing/2010/main"/>
+            </a:ext>
+          </a:extLst>
+        </p:spPr>
+      </p:pic>
+    </p:spTree>
+    <p:extLst>
+      <p:ext uri="{BB962C8B-B14F-4D97-AF65-F5344CB8AC3E}">
+        <p14:creationId xmlns:p14="http://schemas.microsoft.com/office/powerpoint/2010/main" val="1404612365"/>
+      </p:ext>
+    </p:extLst>
+  </p:cSld>
+  <p:clrMapOvr>
+    <a:masterClrMapping/>
+  </p:clrMapOvr>
+</p:sld>
+</file>
+
+<file path=ppt/slides/slide12.xml><?xml version="1.0" encoding="utf-8"?>
+<p:sld xmlns:a="http://schemas.openxmlformats.org/drawingml/2006/main" xmlns:r="http://schemas.openxmlformats.org/officeDocument/2006/relationships" xmlns:p="http://schemas.openxmlformats.org/presentationml/2006/main">
+  <p:cSld>
+    <p:spTree>
+      <p:nvGrpSpPr>
+        <p:cNvPr id="1" name=""/>
+        <p:cNvGrpSpPr/>
+        <p:nvPr/>
+      </p:nvGrpSpPr>
+      <p:grpSpPr>
+        <a:xfrm>
+          <a:off x="0" y="0"/>
+          <a:ext cx="0" cy="0"/>
+          <a:chOff x="0" y="0"/>
+          <a:chExt cx="0" cy="0"/>
+        </a:xfrm>
+      </p:grpSpPr>
+      <p:sp>
+        <p:nvSpPr>
+          <p:cNvPr id="2" name="Title 1"/>
+          <p:cNvSpPr>
+            <a:spLocks noGrp="1"/>
+          </p:cNvSpPr>
+          <p:nvPr>
+            <p:ph type="title"/>
+          </p:nvPr>
+        </p:nvSpPr>
+        <p:spPr>
+          <a:xfrm>
+            <a:off x="3559128" y="2529713"/>
+            <a:ext cx="9404723" cy="1400530"/>
+          </a:xfrm>
+        </p:spPr>
+        <p:txBody>
+          <a:bodyPr/>
+          <a:lstStyle/>
+          <a:p>
+            <a:r>
+              <a:rPr lang="en-IN" sz="6000" dirty="0" smtClean="0">
+                <a:latin typeface="Bell MT" panose="02020503060305020303" pitchFamily="18" charset="0"/>
+              </a:rPr>
+              <a:t>THANK YOU</a:t>
+            </a:r>
+            <a:endParaRPr lang="en-IN" sz="6000" dirty="0">
+              <a:latin typeface="Bell MT" panose="02020503060305020303" pitchFamily="18" charset="0"/>
+            </a:endParaRPr>
+          </a:p>
+        </p:txBody>
+      </p:sp>
+    </p:spTree>
+    <p:extLst>
+      <p:ext uri="{BB962C8B-B14F-4D97-AF65-F5344CB8AC3E}">
+        <p14:creationId xmlns:p14="http://schemas.microsoft.com/office/powerpoint/2010/main" val="1007315242"/>
+      </p:ext>
+    </p:extLst>
+  </p:cSld>
+  <p:clrMapOvr>
+    <a:masterClrMapping/>
+  </p:clrMapOvr>
+</p:sld>
+</file>
+
 <file path=ppt/slides/slide2.xml><?xml version="1.0" encoding="utf-8"?>
 <p:sld xmlns:a="http://schemas.openxmlformats.org/drawingml/2006/main" xmlns:r="http://schemas.openxmlformats.org/officeDocument/2006/relationships" xmlns:p="http://schemas.openxmlformats.org/presentationml/2006/main">
   <p:cSld>
@@ -6112,7 +6417,35 @@
           <a:p>
             <a:r>
               <a:rPr lang="en-IN" dirty="0" smtClean="0"/>
-              <a:t>This Screen allows the user to create the account in the application and once the  account is created user able to login into the application using login credentials.</a:t>
+              <a:t>This Screen allows the user to create </a:t>
+            </a:r>
+            <a:r>
+              <a:rPr lang="en-IN" dirty="0" smtClean="0"/>
+              <a:t>an</a:t>
+            </a:r>
+            <a:r>
+              <a:rPr lang="en-IN" dirty="0" smtClean="0"/>
+              <a:t> </a:t>
+            </a:r>
+            <a:r>
+              <a:rPr lang="en-IN" dirty="0" smtClean="0"/>
+              <a:t>account in the application and once the  account is created </a:t>
+            </a:r>
+            <a:r>
+              <a:rPr lang="en-IN" dirty="0" smtClean="0"/>
+              <a:t>user </a:t>
+            </a:r>
+            <a:r>
+              <a:rPr lang="en-IN" dirty="0" smtClean="0"/>
+              <a:t>can be</a:t>
+            </a:r>
+            <a:r>
+              <a:rPr lang="en-IN" dirty="0" smtClean="0"/>
+              <a:t> </a:t>
+            </a:r>
+            <a:r>
+              <a:rPr lang="en-IN" dirty="0" smtClean="0"/>
+              <a:t>able to login into the application using login credentials.</a:t>
             </a:r>
           </a:p>
           <a:p>
@@ -6244,7 +6577,15 @@
             </a:r>
             <a:r>
               <a:rPr lang="en-IN" dirty="0" smtClean="0"/>
-              <a:t>schedule and  live score of the ongoing match. In a short way we can say all the updates of the league can see on the </a:t>
+              <a:t>schedule and  live score of the ongoing match. In a short way we can say all the updates of the league </a:t>
+            </a:r>
+            <a:r>
+              <a:rPr lang="en-IN" dirty="0" smtClean="0"/>
+              <a:t>can be seen </a:t>
+            </a:r>
+            <a:r>
+              <a:rPr lang="en-IN" dirty="0" smtClean="0"/>
+              <a:t>on the </a:t>
             </a:r>
             <a:r>
               <a:rPr lang="en-IN" dirty="0"/>
@@ -6593,13 +6934,49 @@
           <a:p>
             <a:r>
               <a:rPr lang="en-IN" dirty="0" smtClean="0"/>
-              <a:t>After the result of every match there should be a page which shows the position of the every team in the league.</a:t>
-            </a:r>
-          </a:p>
-          <a:p>
+              <a:t>After the result of every match </a:t>
+            </a:r>
             <a:r>
               <a:rPr lang="en-IN" dirty="0" smtClean="0"/>
-              <a:t>This screen gives the information to the customer that which team is leading in the tournament and what are the teams going to clear playoffs all the information is recorded in the Points table screen. </a:t>
+              <a:t>this </a:t>
+            </a:r>
+            <a:r>
+              <a:rPr lang="en-IN" dirty="0" smtClean="0"/>
+              <a:t>page </a:t>
+            </a:r>
+            <a:r>
+              <a:rPr lang="en-IN" dirty="0" smtClean="0"/>
+              <a:t>will show </a:t>
+            </a:r>
+            <a:r>
+              <a:rPr lang="en-IN" dirty="0" smtClean="0"/>
+              <a:t>the position of </a:t>
+            </a:r>
+            <a:r>
+              <a:rPr lang="en-IN" dirty="0" smtClean="0"/>
+              <a:t> </a:t>
+            </a:r>
+            <a:r>
+              <a:rPr lang="en-IN" dirty="0" smtClean="0"/>
+              <a:t>every team in the league.</a:t>
+            </a:r>
+          </a:p>
+          <a:p>
+            <a:r>
+              <a:rPr lang="en-IN" dirty="0" smtClean="0"/>
+              <a:t>This screen gives the information to the </a:t>
+            </a:r>
+            <a:r>
+              <a:rPr lang="en-IN" dirty="0" smtClean="0"/>
+              <a:t>user</a:t>
+            </a:r>
+            <a:r>
+              <a:rPr lang="en-IN" dirty="0" smtClean="0"/>
+              <a:t> </a:t>
+            </a:r>
+            <a:r>
+              <a:rPr lang="en-IN" dirty="0" smtClean="0"/>
+              <a:t>that which team is leading in the tournament and what are the teams going to clear playoffs all the information is recorded in the Points table screen. </a:t>
             </a:r>
             <a:endParaRPr lang="en-IN" dirty="0"/>
           </a:p>
@@ -6681,7 +7058,7 @@
           <a:p>
             <a:r>
               <a:rPr lang="en-IN" dirty="0" smtClean="0"/>
-              <a:t>News Screen</a:t>
+              <a:t>Fantasy Screen</a:t>
             </a:r>
             <a:endParaRPr lang="en-IN" dirty="0"/>
           </a:p>
@@ -6699,8 +7076,8 @@
         </p:nvSpPr>
         <p:spPr>
           <a:xfrm>
-            <a:off x="175850" y="1375051"/>
-            <a:ext cx="6172700" cy="3079383"/>
+            <a:off x="91440" y="1235883"/>
+            <a:ext cx="6126480" cy="2704011"/>
           </a:xfrm>
         </p:spPr>
         <p:txBody>
@@ -6713,25 +7090,7 @@
             </a:pPr>
             <a:r>
               <a:rPr lang="en-IN" dirty="0" smtClean="0"/>
-              <a:t>This screen provides the information regarding the upcoming matches in the league and also the match reports of the league.</a:t>
-            </a:r>
-          </a:p>
-          <a:p>
-            <a:pPr>
-              <a:buFont typeface="Wingdings" panose="05000000000000000000" pitchFamily="2" charset="2"/>
-              <a:buChar char="Ø"/>
-            </a:pPr>
-            <a:r>
-              <a:rPr lang="en-IN" dirty="0" smtClean="0"/>
-              <a:t>This screen also provide the information of </a:t>
-            </a:r>
-            <a:r>
-              <a:rPr lang="en-IN" dirty="0"/>
-              <a:t>P</a:t>
-            </a:r>
-            <a:r>
-              <a:rPr lang="en-IN" dirty="0" smtClean="0"/>
-              <a:t>robable XI of teams before match start.</a:t>
+              <a:t>In this screen user can earn points by participating in the fantasy league and also user have multiple options to participate in the league.</a:t>
             </a:r>
             <a:endParaRPr lang="en-IN" dirty="0"/>
           </a:p>
@@ -6745,13 +7104,13 @@
         </p:nvPicPr>
         <p:blipFill rotWithShape="1">
           <a:blip r:embed="rId2"/>
-          <a:srcRect t="3842" r="2947" b="6600"/>
+          <a:srcRect t="6798" r="2614" b="6010"/>
           <a:stretch/>
         </p:blipFill>
         <p:spPr bwMode="auto">
           <a:xfrm>
-            <a:off x="5786846" y="914401"/>
-            <a:ext cx="6139543" cy="3971108"/>
+            <a:off x="6008914" y="1187359"/>
+            <a:ext cx="5848404" cy="3510140"/>
           </a:xfrm>
           <a:prstGeom prst="rect">
             <a:avLst/>
@@ -6769,7 +7128,7 @@
     </p:spTree>
     <p:extLst>
       <p:ext uri="{BB962C8B-B14F-4D97-AF65-F5344CB8AC3E}">
-        <p14:creationId xmlns:p14="http://schemas.microsoft.com/office/powerpoint/2010/main" val="3295343465"/>
+        <p14:creationId xmlns:p14="http://schemas.microsoft.com/office/powerpoint/2010/main" val="3621161875"/>
       </p:ext>
     </p:extLst>
   </p:cSld>
@@ -6813,7 +7172,7 @@
           <a:p>
             <a:r>
               <a:rPr lang="en-IN" dirty="0" smtClean="0"/>
-              <a:t>Social Media Screen</a:t>
+              <a:t>News Screen</a:t>
             </a:r>
             <a:endParaRPr lang="en-IN" dirty="0"/>
           </a:p>
@@ -6831,49 +7190,63 @@
         </p:nvSpPr>
         <p:spPr>
           <a:xfrm>
-            <a:off x="201975" y="1152983"/>
-            <a:ext cx="5467305" cy="4195481"/>
-          </a:xfrm>
-        </p:spPr>
-        <p:txBody>
-          <a:bodyPr/>
-          <a:lstStyle/>
-          <a:p>
+            <a:off x="175850" y="1375051"/>
+            <a:ext cx="6172700" cy="3079383"/>
+          </a:xfrm>
+        </p:spPr>
+        <p:txBody>
+          <a:bodyPr/>
+          <a:lstStyle/>
+          <a:p>
+            <a:pPr>
+              <a:buFont typeface="Wingdings" panose="05000000000000000000" pitchFamily="2" charset="2"/>
+              <a:buChar char="Ø"/>
+            </a:pPr>
+            <a:r>
+              <a:rPr lang="en-IN" dirty="0" smtClean="0"/>
+              <a:t>This screen provides the information regarding the upcoming matches in the league and also the match reports of the league.</a:t>
+            </a:r>
+          </a:p>
+          <a:p>
+            <a:pPr>
+              <a:buFont typeface="Wingdings" panose="05000000000000000000" pitchFamily="2" charset="2"/>
+              <a:buChar char="Ø"/>
+            </a:pPr>
+            <a:r>
+              <a:rPr lang="en-IN" dirty="0" smtClean="0"/>
+              <a:t>This screen also provide the information of </a:t>
+            </a:r>
             <a:r>
               <a:rPr lang="en-IN" dirty="0"/>
-              <a:t>The internet changed the way people interact with each other as well as work culture, and those changes first arose on social media sites. That is why social networks for apps are so important</a:t>
+              <a:t>P</a:t>
             </a:r>
             <a:r>
               <a:rPr lang="en-IN" dirty="0" smtClean="0"/>
-              <a:t>.</a:t>
-            </a:r>
-          </a:p>
-          <a:p>
+              <a:t>robable XI of teams before match </a:t>
+            </a:r>
             <a:r>
               <a:rPr lang="en-IN" dirty="0" smtClean="0"/>
-              <a:t>This screen intimates the users to follow the application in all the mentioned social networking sites for new updates of the application.</a:t>
-            </a:r>
-          </a:p>
-          <a:p>
+              <a:t>starts.</a:t>
+            </a:r>
             <a:endParaRPr lang="en-IN" dirty="0"/>
           </a:p>
         </p:txBody>
       </p:sp>
       <p:pic>
         <p:nvPicPr>
-          <p:cNvPr id="4" name="Picture 3"/>
+          <p:cNvPr id="5" name="Picture 4"/>
           <p:cNvPicPr/>
           <p:nvPr/>
         </p:nvPicPr>
         <p:blipFill rotWithShape="1">
           <a:blip r:embed="rId2"/>
-          <a:srcRect t="2956" r="3778" b="5714"/>
+          <a:srcRect t="7389" r="2282" b="6306"/>
           <a:stretch/>
         </p:blipFill>
         <p:spPr bwMode="auto">
           <a:xfrm>
-            <a:off x="5812970" y="1278119"/>
-            <a:ext cx="5682344" cy="3542075"/>
+            <a:off x="5869033" y="1005840"/>
+            <a:ext cx="6214110" cy="3931920"/>
           </a:xfrm>
           <a:prstGeom prst="rect">
             <a:avLst/>
@@ -6891,7 +7264,7 @@
     </p:spTree>
     <p:extLst>
       <p:ext uri="{BB962C8B-B14F-4D97-AF65-F5344CB8AC3E}">
-        <p14:creationId xmlns:p14="http://schemas.microsoft.com/office/powerpoint/2010/main" val="1197301406"/>
+        <p14:creationId xmlns:p14="http://schemas.microsoft.com/office/powerpoint/2010/main" val="3295343465"/>
       </p:ext>
     </p:extLst>
   </p:cSld>
@@ -6928,32 +7301,80 @@
             <p:ph type="title"/>
           </p:nvPr>
         </p:nvSpPr>
+        <p:spPr/>
+        <p:txBody>
+          <a:bodyPr/>
+          <a:lstStyle/>
+          <a:p>
+            <a:r>
+              <a:rPr lang="en-IN" dirty="0" smtClean="0"/>
+              <a:t>Teams Screen</a:t>
+            </a:r>
+            <a:endParaRPr lang="en-IN" dirty="0"/>
+          </a:p>
+        </p:txBody>
+      </p:sp>
+      <p:sp>
+        <p:nvSpPr>
+          <p:cNvPr id="3" name="Content Placeholder 2"/>
+          <p:cNvSpPr>
+            <a:spLocks noGrp="1"/>
+          </p:cNvSpPr>
+          <p:nvPr>
+            <p:ph idx="1"/>
+          </p:nvPr>
+        </p:nvSpPr>
         <p:spPr>
           <a:xfrm>
-            <a:off x="3559128" y="2529713"/>
-            <a:ext cx="9404723" cy="1400530"/>
-          </a:xfrm>
-        </p:spPr>
-        <p:txBody>
-          <a:bodyPr/>
-          <a:lstStyle/>
-          <a:p>
-            <a:r>
-              <a:rPr lang="en-IN" sz="6000" dirty="0" smtClean="0">
-                <a:latin typeface="Bell MT" panose="02020503060305020303" pitchFamily="18" charset="0"/>
-              </a:rPr>
-              <a:t>THANK YOU</a:t>
-            </a:r>
-            <a:endParaRPr lang="en-IN" sz="6000" dirty="0">
-              <a:latin typeface="Bell MT" panose="02020503060305020303" pitchFamily="18" charset="0"/>
-            </a:endParaRPr>
-          </a:p>
-        </p:txBody>
-      </p:sp>
+            <a:off x="136662" y="1152983"/>
+            <a:ext cx="5798910" cy="4195481"/>
+          </a:xfrm>
+        </p:spPr>
+        <p:txBody>
+          <a:bodyPr/>
+          <a:lstStyle/>
+          <a:p>
+            <a:r>
+              <a:rPr lang="en-IN" dirty="0" smtClean="0"/>
+              <a:t>In this screen user will be able to see all the teams participating in the league.</a:t>
+            </a:r>
+            <a:endParaRPr lang="en-IN" dirty="0"/>
+          </a:p>
+        </p:txBody>
+      </p:sp>
+      <p:pic>
+        <p:nvPicPr>
+          <p:cNvPr id="4" name="Picture 3"/>
+          <p:cNvPicPr/>
+          <p:nvPr/>
+        </p:nvPicPr>
+        <p:blipFill rotWithShape="1">
+          <a:blip r:embed="rId2"/>
+          <a:srcRect t="7094" r="2780" b="6010"/>
+          <a:stretch/>
+        </p:blipFill>
+        <p:spPr bwMode="auto">
+          <a:xfrm>
+            <a:off x="5935571" y="1349555"/>
+            <a:ext cx="6256429" cy="3444513"/>
+          </a:xfrm>
+          <a:prstGeom prst="rect">
+            <a:avLst/>
+          </a:prstGeom>
+          <a:ln>
+            <a:noFill/>
+          </a:ln>
+          <a:extLst>
+            <a:ext uri="{53640926-AAD7-44D8-BBD7-CCE9431645EC}">
+              <a14:shadowObscured xmlns:a14="http://schemas.microsoft.com/office/drawing/2010/main"/>
+            </a:ext>
+          </a:extLst>
+        </p:spPr>
+      </p:pic>
     </p:spTree>
     <p:extLst>
       <p:ext uri="{BB962C8B-B14F-4D97-AF65-F5344CB8AC3E}">
-        <p14:creationId xmlns:p14="http://schemas.microsoft.com/office/powerpoint/2010/main" val="1007315242"/>
+        <p14:creationId xmlns:p14="http://schemas.microsoft.com/office/powerpoint/2010/main" val="2364745891"/>
       </p:ext>
     </p:extLst>
   </p:cSld>

</xml_diff>